<commit_message>
Added cloning image to slides
</commit_message>
<xml_diff>
--- a/Introduction and Git.pptx
+++ b/Introduction and Git.pptx
@@ -306,7 +306,7 @@
           <a:p>
             <a:fld id="{4AAD347D-5ACD-4C99-B74B-A9C85AD731AF}" type="datetimeFigureOut">
               <a:rPr lang="en-US" dirty="0"/>
-              <a:t>9/8/2015</a:t>
+              <a:t>9/9/2015</a:t>
             </a:fld>
             <a:endParaRPr lang="en-US" dirty="0"/>
           </a:p>
@@ -576,7 +576,7 @@
           <a:p>
             <a:fld id="{4509A250-FF31-4206-8172-F9D3106AACB1}" type="datetimeFigureOut">
               <a:rPr lang="en-US" dirty="0"/>
-              <a:t>9/8/2015</a:t>
+              <a:t>9/9/2015</a:t>
             </a:fld>
             <a:endParaRPr lang="en-US" dirty="0"/>
           </a:p>
@@ -765,7 +765,7 @@
           <a:p>
             <a:fld id="{4509A250-FF31-4206-8172-F9D3106AACB1}" type="datetimeFigureOut">
               <a:rPr lang="en-US" dirty="0"/>
-              <a:t>9/8/2015</a:t>
+              <a:t>9/9/2015</a:t>
             </a:fld>
             <a:endParaRPr lang="en-US" dirty="0"/>
           </a:p>
@@ -1033,7 +1033,7 @@
           <a:p>
             <a:fld id="{4509A250-FF31-4206-8172-F9D3106AACB1}" type="datetimeFigureOut">
               <a:rPr lang="en-US" dirty="0"/>
-              <a:t>9/8/2015</a:t>
+              <a:t>9/9/2015</a:t>
             </a:fld>
             <a:endParaRPr lang="en-US" dirty="0"/>
           </a:p>
@@ -1369,7 +1369,7 @@
           <a:p>
             <a:fld id="{4509A250-FF31-4206-8172-F9D3106AACB1}" type="datetimeFigureOut">
               <a:rPr lang="en-US" dirty="0"/>
-              <a:t>9/8/2015</a:t>
+              <a:t>9/9/2015</a:t>
             </a:fld>
             <a:endParaRPr lang="en-US" dirty="0"/>
           </a:p>
@@ -1987,7 +1987,7 @@
           <a:p>
             <a:fld id="{4509A250-FF31-4206-8172-F9D3106AACB1}" type="datetimeFigureOut">
               <a:rPr lang="en-US" dirty="0"/>
-              <a:t>9/8/2015</a:t>
+              <a:t>9/9/2015</a:t>
             </a:fld>
             <a:endParaRPr lang="en-US" dirty="0"/>
           </a:p>
@@ -2842,7 +2842,7 @@
           <a:p>
             <a:fld id="{4509A250-FF31-4206-8172-F9D3106AACB1}" type="datetimeFigureOut">
               <a:rPr lang="en-US" dirty="0"/>
-              <a:t>9/8/2015</a:t>
+              <a:t>9/9/2015</a:t>
             </a:fld>
             <a:endParaRPr lang="en-US" dirty="0"/>
           </a:p>
@@ -3007,7 +3007,7 @@
           <a:p>
             <a:fld id="{4509A250-FF31-4206-8172-F9D3106AACB1}" type="datetimeFigureOut">
               <a:rPr lang="en-US" dirty="0"/>
-              <a:t>9/8/2015</a:t>
+              <a:t>9/9/2015</a:t>
             </a:fld>
             <a:endParaRPr lang="en-US" dirty="0"/>
           </a:p>
@@ -3182,7 +3182,7 @@
           <a:p>
             <a:fld id="{4509A250-FF31-4206-8172-F9D3106AACB1}" type="datetimeFigureOut">
               <a:rPr lang="en-US" dirty="0"/>
-              <a:t>9/8/2015</a:t>
+              <a:t>9/9/2015</a:t>
             </a:fld>
             <a:endParaRPr lang="en-US" dirty="0"/>
           </a:p>
@@ -3347,7 +3347,7 @@
           <a:p>
             <a:fld id="{4509A250-FF31-4206-8172-F9D3106AACB1}" type="datetimeFigureOut">
               <a:rPr lang="en-US" dirty="0"/>
-              <a:t>9/8/2015</a:t>
+              <a:t>9/9/2015</a:t>
             </a:fld>
             <a:endParaRPr lang="en-US" dirty="0"/>
           </a:p>
@@ -3589,7 +3589,7 @@
           <a:p>
             <a:fld id="{9796027F-7875-4030-9381-8BD8C4F21935}" type="datetimeFigureOut">
               <a:rPr lang="en-US" dirty="0"/>
-              <a:t>9/8/2015</a:t>
+              <a:t>9/9/2015</a:t>
             </a:fld>
             <a:endParaRPr lang="en-US" dirty="0"/>
           </a:p>
@@ -3876,7 +3876,7 @@
           <a:p>
             <a:fld id="{9796027F-7875-4030-9381-8BD8C4F21935}" type="datetimeFigureOut">
               <a:rPr lang="en-US" dirty="0"/>
-              <a:t>9/8/2015</a:t>
+              <a:t>9/9/2015</a:t>
             </a:fld>
             <a:endParaRPr lang="en-US" dirty="0"/>
           </a:p>
@@ -4315,7 +4315,7 @@
           <a:p>
             <a:fld id="{9796027F-7875-4030-9381-8BD8C4F21935}" type="datetimeFigureOut">
               <a:rPr lang="en-US" dirty="0"/>
-              <a:t>9/8/2015</a:t>
+              <a:t>9/9/2015</a:t>
             </a:fld>
             <a:endParaRPr lang="en-US" dirty="0"/>
           </a:p>
@@ -4428,7 +4428,7 @@
           <a:p>
             <a:fld id="{4509A250-FF31-4206-8172-F9D3106AACB1}" type="datetimeFigureOut">
               <a:rPr lang="en-US" dirty="0"/>
-              <a:t>9/8/2015</a:t>
+              <a:t>9/9/2015</a:t>
             </a:fld>
             <a:endParaRPr lang="en-US" dirty="0"/>
           </a:p>
@@ -4518,7 +4518,7 @@
           <a:p>
             <a:fld id="{4509A250-FF31-4206-8172-F9D3106AACB1}" type="datetimeFigureOut">
               <a:rPr lang="en-US" dirty="0"/>
-              <a:t>9/8/2015</a:t>
+              <a:t>9/9/2015</a:t>
             </a:fld>
             <a:endParaRPr lang="en-US" dirty="0"/>
           </a:p>
@@ -4792,7 +4792,7 @@
           <a:p>
             <a:fld id="{4509A250-FF31-4206-8172-F9D3106AACB1}" type="datetimeFigureOut">
               <a:rPr lang="en-US" dirty="0"/>
-              <a:t>9/8/2015</a:t>
+              <a:t>9/9/2015</a:t>
             </a:fld>
             <a:endParaRPr lang="en-US" dirty="0"/>
           </a:p>
@@ -5062,7 +5062,7 @@
           <a:p>
             <a:fld id="{4509A250-FF31-4206-8172-F9D3106AACB1}" type="datetimeFigureOut">
               <a:rPr lang="en-US" dirty="0"/>
-              <a:t>9/8/2015</a:t>
+              <a:t>9/9/2015</a:t>
             </a:fld>
             <a:endParaRPr lang="en-US" dirty="0"/>
           </a:p>
@@ -5486,7 +5486,7 @@
           <a:p>
             <a:fld id="{4AAD347D-5ACD-4C99-B74B-A9C85AD731AF}" type="datetimeFigureOut">
               <a:rPr lang="en-US" dirty="0"/>
-              <a:t>9/8/2015</a:t>
+              <a:t>9/9/2015</a:t>
             </a:fld>
             <a:endParaRPr lang="en-US" dirty="0"/>
           </a:p>
@@ -6854,9 +6854,39 @@
         </p:blipFill>
         <p:spPr>
           <a:xfrm>
-            <a:off x="3602412" y="2052638"/>
+            <a:off x="1399520" y="1853248"/>
             <a:ext cx="3948952" cy="4195762"/>
           </a:xfrm>
+        </p:spPr>
+      </p:pic>
+      <p:pic>
+        <p:nvPicPr>
+          <p:cNvPr id="3" name="Picture 2"/>
+          <p:cNvPicPr>
+            <a:picLocks noChangeAspect="1"/>
+          </p:cNvPicPr>
+          <p:nvPr/>
+        </p:nvPicPr>
+        <p:blipFill>
+          <a:blip r:embed="rId3">
+            <a:extLst>
+              <a:ext uri="{28A0092B-C50C-407E-A947-70E740481C1C}">
+                <a14:useLocalDpi xmlns:a14="http://schemas.microsoft.com/office/drawing/2010/main" val="0"/>
+              </a:ext>
+            </a:extLst>
+          </a:blip>
+          <a:stretch>
+            <a:fillRect/>
+          </a:stretch>
+        </p:blipFill>
+        <p:spPr>
+          <a:xfrm>
+            <a:off x="6253002" y="1851914"/>
+            <a:ext cx="4350478" cy="4197096"/>
+          </a:xfrm>
+          <a:prstGeom prst="rect">
+            <a:avLst/>
+          </a:prstGeom>
         </p:spPr>
       </p:pic>
     </p:spTree>

</xml_diff>

<commit_message>
Added Hello World and Variables
</commit_message>
<xml_diff>
--- a/Introduction and Git.pptx
+++ b/Introduction and Git.pptx
@@ -9,11 +9,12 @@
     <p:sldId id="257" r:id="rId3"/>
     <p:sldId id="258" r:id="rId4"/>
     <p:sldId id="260" r:id="rId5"/>
-    <p:sldId id="259" r:id="rId6"/>
-    <p:sldId id="261" r:id="rId7"/>
-    <p:sldId id="262" r:id="rId8"/>
-    <p:sldId id="263" r:id="rId9"/>
-    <p:sldId id="264" r:id="rId10"/>
+    <p:sldId id="265" r:id="rId6"/>
+    <p:sldId id="266" r:id="rId7"/>
+    <p:sldId id="259" r:id="rId8"/>
+    <p:sldId id="261" r:id="rId9"/>
+    <p:sldId id="262" r:id="rId10"/>
+    <p:sldId id="264" r:id="rId11"/>
   </p:sldIdLst>
   <p:sldSz cx="12192000" cy="6858000"/>
   <p:notesSz cx="6858000" cy="9144000"/>
@@ -306,7 +307,7 @@
           <a:p>
             <a:fld id="{4AAD347D-5ACD-4C99-B74B-A9C85AD731AF}" type="datetimeFigureOut">
               <a:rPr lang="en-US" dirty="0"/>
-              <a:t>9/9/2015</a:t>
+              <a:t>9/13/2015</a:t>
             </a:fld>
             <a:endParaRPr lang="en-US" dirty="0"/>
           </a:p>
@@ -576,7 +577,7 @@
           <a:p>
             <a:fld id="{4509A250-FF31-4206-8172-F9D3106AACB1}" type="datetimeFigureOut">
               <a:rPr lang="en-US" dirty="0"/>
-              <a:t>9/9/2015</a:t>
+              <a:t>9/13/2015</a:t>
             </a:fld>
             <a:endParaRPr lang="en-US" dirty="0"/>
           </a:p>
@@ -765,7 +766,7 @@
           <a:p>
             <a:fld id="{4509A250-FF31-4206-8172-F9D3106AACB1}" type="datetimeFigureOut">
               <a:rPr lang="en-US" dirty="0"/>
-              <a:t>9/9/2015</a:t>
+              <a:t>9/13/2015</a:t>
             </a:fld>
             <a:endParaRPr lang="en-US" dirty="0"/>
           </a:p>
@@ -1033,7 +1034,7 @@
           <a:p>
             <a:fld id="{4509A250-FF31-4206-8172-F9D3106AACB1}" type="datetimeFigureOut">
               <a:rPr lang="en-US" dirty="0"/>
-              <a:t>9/9/2015</a:t>
+              <a:t>9/13/2015</a:t>
             </a:fld>
             <a:endParaRPr lang="en-US" dirty="0"/>
           </a:p>
@@ -1369,7 +1370,7 @@
           <a:p>
             <a:fld id="{4509A250-FF31-4206-8172-F9D3106AACB1}" type="datetimeFigureOut">
               <a:rPr lang="en-US" dirty="0"/>
-              <a:t>9/9/2015</a:t>
+              <a:t>9/13/2015</a:t>
             </a:fld>
             <a:endParaRPr lang="en-US" dirty="0"/>
           </a:p>
@@ -1987,7 +1988,7 @@
           <a:p>
             <a:fld id="{4509A250-FF31-4206-8172-F9D3106AACB1}" type="datetimeFigureOut">
               <a:rPr lang="en-US" dirty="0"/>
-              <a:t>9/9/2015</a:t>
+              <a:t>9/13/2015</a:t>
             </a:fld>
             <a:endParaRPr lang="en-US" dirty="0"/>
           </a:p>
@@ -2842,7 +2843,7 @@
           <a:p>
             <a:fld id="{4509A250-FF31-4206-8172-F9D3106AACB1}" type="datetimeFigureOut">
               <a:rPr lang="en-US" dirty="0"/>
-              <a:t>9/9/2015</a:t>
+              <a:t>9/13/2015</a:t>
             </a:fld>
             <a:endParaRPr lang="en-US" dirty="0"/>
           </a:p>
@@ -3007,7 +3008,7 @@
           <a:p>
             <a:fld id="{4509A250-FF31-4206-8172-F9D3106AACB1}" type="datetimeFigureOut">
               <a:rPr lang="en-US" dirty="0"/>
-              <a:t>9/9/2015</a:t>
+              <a:t>9/13/2015</a:t>
             </a:fld>
             <a:endParaRPr lang="en-US" dirty="0"/>
           </a:p>
@@ -3182,7 +3183,7 @@
           <a:p>
             <a:fld id="{4509A250-FF31-4206-8172-F9D3106AACB1}" type="datetimeFigureOut">
               <a:rPr lang="en-US" dirty="0"/>
-              <a:t>9/9/2015</a:t>
+              <a:t>9/13/2015</a:t>
             </a:fld>
             <a:endParaRPr lang="en-US" dirty="0"/>
           </a:p>
@@ -3347,7 +3348,7 @@
           <a:p>
             <a:fld id="{4509A250-FF31-4206-8172-F9D3106AACB1}" type="datetimeFigureOut">
               <a:rPr lang="en-US" dirty="0"/>
-              <a:t>9/9/2015</a:t>
+              <a:t>9/13/2015</a:t>
             </a:fld>
             <a:endParaRPr lang="en-US" dirty="0"/>
           </a:p>
@@ -3589,7 +3590,7 @@
           <a:p>
             <a:fld id="{9796027F-7875-4030-9381-8BD8C4F21935}" type="datetimeFigureOut">
               <a:rPr lang="en-US" dirty="0"/>
-              <a:t>9/9/2015</a:t>
+              <a:t>9/13/2015</a:t>
             </a:fld>
             <a:endParaRPr lang="en-US" dirty="0"/>
           </a:p>
@@ -3876,7 +3877,7 @@
           <a:p>
             <a:fld id="{9796027F-7875-4030-9381-8BD8C4F21935}" type="datetimeFigureOut">
               <a:rPr lang="en-US" dirty="0"/>
-              <a:t>9/9/2015</a:t>
+              <a:t>9/13/2015</a:t>
             </a:fld>
             <a:endParaRPr lang="en-US" dirty="0"/>
           </a:p>
@@ -4315,7 +4316,7 @@
           <a:p>
             <a:fld id="{9796027F-7875-4030-9381-8BD8C4F21935}" type="datetimeFigureOut">
               <a:rPr lang="en-US" dirty="0"/>
-              <a:t>9/9/2015</a:t>
+              <a:t>9/13/2015</a:t>
             </a:fld>
             <a:endParaRPr lang="en-US" dirty="0"/>
           </a:p>
@@ -4428,7 +4429,7 @@
           <a:p>
             <a:fld id="{4509A250-FF31-4206-8172-F9D3106AACB1}" type="datetimeFigureOut">
               <a:rPr lang="en-US" dirty="0"/>
-              <a:t>9/9/2015</a:t>
+              <a:t>9/13/2015</a:t>
             </a:fld>
             <a:endParaRPr lang="en-US" dirty="0"/>
           </a:p>
@@ -4518,7 +4519,7 @@
           <a:p>
             <a:fld id="{4509A250-FF31-4206-8172-F9D3106AACB1}" type="datetimeFigureOut">
               <a:rPr lang="en-US" dirty="0"/>
-              <a:t>9/9/2015</a:t>
+              <a:t>9/13/2015</a:t>
             </a:fld>
             <a:endParaRPr lang="en-US" dirty="0"/>
           </a:p>
@@ -4792,7 +4793,7 @@
           <a:p>
             <a:fld id="{4509A250-FF31-4206-8172-F9D3106AACB1}" type="datetimeFigureOut">
               <a:rPr lang="en-US" dirty="0"/>
-              <a:t>9/9/2015</a:t>
+              <a:t>9/13/2015</a:t>
             </a:fld>
             <a:endParaRPr lang="en-US" dirty="0"/>
           </a:p>
@@ -5062,7 +5063,7 @@
           <a:p>
             <a:fld id="{4509A250-FF31-4206-8172-F9D3106AACB1}" type="datetimeFigureOut">
               <a:rPr lang="en-US" dirty="0"/>
-              <a:t>9/9/2015</a:t>
+              <a:t>9/13/2015</a:t>
             </a:fld>
             <a:endParaRPr lang="en-US" dirty="0"/>
           </a:p>
@@ -5486,7 +5487,7 @@
           <a:p>
             <a:fld id="{4AAD347D-5ACD-4C99-B74B-A9C85AD731AF}" type="datetimeFigureOut">
               <a:rPr lang="en-US" dirty="0"/>
-              <a:t>9/9/2015</a:t>
+              <a:t>9/13/2015</a:t>
             </a:fld>
             <a:endParaRPr lang="en-US" dirty="0"/>
           </a:p>
@@ -6065,732 +6066,7 @@
 </p:sld>
 </file>
 
-<file path=ppt/slides/slide2.xml><?xml version="1.0" encoding="utf-8"?>
-<p:sld xmlns:a="http://schemas.openxmlformats.org/drawingml/2006/main" xmlns:r="http://schemas.openxmlformats.org/officeDocument/2006/relationships" xmlns:p="http://schemas.openxmlformats.org/presentationml/2006/main">
-  <p:cSld>
-    <p:spTree>
-      <p:nvGrpSpPr>
-        <p:cNvPr id="1" name=""/>
-        <p:cNvGrpSpPr/>
-        <p:nvPr/>
-      </p:nvGrpSpPr>
-      <p:grpSpPr>
-        <a:xfrm>
-          <a:off x="0" y="0"/>
-          <a:ext cx="0" cy="0"/>
-          <a:chOff x="0" y="0"/>
-          <a:chExt cx="0" cy="0"/>
-        </a:xfrm>
-      </p:grpSpPr>
-      <p:sp>
-        <p:nvSpPr>
-          <p:cNvPr id="2" name="Title 1"/>
-          <p:cNvSpPr>
-            <a:spLocks noGrp="1"/>
-          </p:cNvSpPr>
-          <p:nvPr>
-            <p:ph type="title"/>
-          </p:nvPr>
-        </p:nvSpPr>
-        <p:spPr/>
-        <p:txBody>
-          <a:bodyPr/>
-          <a:lstStyle/>
-          <a:p>
-            <a:r>
-              <a:rPr lang="en-US" dirty="0" smtClean="0"/>
-              <a:t>Topics to Cover</a:t>
-            </a:r>
-            <a:endParaRPr lang="en-US" dirty="0"/>
-          </a:p>
-        </p:txBody>
-      </p:sp>
-      <p:sp>
-        <p:nvSpPr>
-          <p:cNvPr id="3" name="Content Placeholder 2"/>
-          <p:cNvSpPr>
-            <a:spLocks noGrp="1"/>
-          </p:cNvSpPr>
-          <p:nvPr>
-            <p:ph idx="1"/>
-          </p:nvPr>
-        </p:nvSpPr>
-        <p:spPr/>
-        <p:txBody>
-          <a:bodyPr/>
-          <a:lstStyle/>
-          <a:p>
-            <a:r>
-              <a:rPr lang="en-US" dirty="0" err="1" smtClean="0"/>
-              <a:t>Git</a:t>
-            </a:r>
-            <a:r>
-              <a:rPr lang="en-US" dirty="0" smtClean="0"/>
-              <a:t>/VCS</a:t>
-            </a:r>
-          </a:p>
-          <a:p>
-            <a:r>
-              <a:rPr lang="en-US" dirty="0" smtClean="0"/>
-              <a:t>Java “Hello World”</a:t>
-            </a:r>
-          </a:p>
-          <a:p>
-            <a:r>
-              <a:rPr lang="en-US" dirty="0" smtClean="0"/>
-              <a:t>Variables and Types</a:t>
-            </a:r>
-          </a:p>
-          <a:p>
-            <a:r>
-              <a:rPr lang="en-US" dirty="0" smtClean="0"/>
-              <a:t>Basic Operations</a:t>
-            </a:r>
-          </a:p>
-          <a:p>
-            <a:pPr lvl="1"/>
-            <a:r>
-              <a:rPr lang="en-US" dirty="0" smtClean="0"/>
-              <a:t>+ - * /</a:t>
-            </a:r>
-          </a:p>
-          <a:p>
-            <a:r>
-              <a:rPr lang="en-US" dirty="0" smtClean="0"/>
-              <a:t>Functions</a:t>
-            </a:r>
-          </a:p>
-          <a:p>
-            <a:r>
-              <a:rPr lang="en-US" dirty="0" smtClean="0"/>
-              <a:t>While Loops</a:t>
-            </a:r>
-          </a:p>
-          <a:p>
-            <a:r>
-              <a:rPr lang="en-US" dirty="0" smtClean="0"/>
-              <a:t>For Loops</a:t>
-            </a:r>
-          </a:p>
-          <a:p>
-            <a:r>
-              <a:rPr lang="en-US" dirty="0" smtClean="0"/>
-              <a:t>Collections</a:t>
-            </a:r>
-            <a:endParaRPr lang="en-US" dirty="0"/>
-          </a:p>
-        </p:txBody>
-      </p:sp>
-    </p:spTree>
-    <p:extLst>
-      <p:ext uri="{BB962C8B-B14F-4D97-AF65-F5344CB8AC3E}">
-        <p14:creationId xmlns:p14="http://schemas.microsoft.com/office/powerpoint/2010/main" val="2999560502"/>
-      </p:ext>
-    </p:extLst>
-  </p:cSld>
-  <p:clrMapOvr>
-    <a:masterClrMapping/>
-  </p:clrMapOvr>
-</p:sld>
-</file>
-
-<file path=ppt/slides/slide3.xml><?xml version="1.0" encoding="utf-8"?>
-<p:sld xmlns:a="http://schemas.openxmlformats.org/drawingml/2006/main" xmlns:r="http://schemas.openxmlformats.org/officeDocument/2006/relationships" xmlns:p="http://schemas.openxmlformats.org/presentationml/2006/main">
-  <p:cSld>
-    <p:spTree>
-      <p:nvGrpSpPr>
-        <p:cNvPr id="1" name=""/>
-        <p:cNvGrpSpPr/>
-        <p:nvPr/>
-      </p:nvGrpSpPr>
-      <p:grpSpPr>
-        <a:xfrm>
-          <a:off x="0" y="0"/>
-          <a:ext cx="0" cy="0"/>
-          <a:chOff x="0" y="0"/>
-          <a:chExt cx="0" cy="0"/>
-        </a:xfrm>
-      </p:grpSpPr>
-      <p:sp>
-        <p:nvSpPr>
-          <p:cNvPr id="2" name="Title 1"/>
-          <p:cNvSpPr>
-            <a:spLocks noGrp="1"/>
-          </p:cNvSpPr>
-          <p:nvPr>
-            <p:ph type="title"/>
-          </p:nvPr>
-        </p:nvSpPr>
-        <p:spPr/>
-        <p:txBody>
-          <a:bodyPr/>
-          <a:lstStyle/>
-          <a:p>
-            <a:r>
-              <a:rPr lang="en-US" dirty="0" smtClean="0"/>
-              <a:t>Topics to Cover (cont.)</a:t>
-            </a:r>
-            <a:endParaRPr lang="en-US" dirty="0"/>
-          </a:p>
-        </p:txBody>
-      </p:sp>
-      <p:sp>
-        <p:nvSpPr>
-          <p:cNvPr id="3" name="Content Placeholder 2"/>
-          <p:cNvSpPr>
-            <a:spLocks noGrp="1"/>
-          </p:cNvSpPr>
-          <p:nvPr>
-            <p:ph idx="1"/>
-          </p:nvPr>
-        </p:nvSpPr>
-        <p:spPr/>
-        <p:txBody>
-          <a:bodyPr/>
-          <a:lstStyle/>
-          <a:p>
-            <a:r>
-              <a:rPr lang="en-US" dirty="0" smtClean="0"/>
-              <a:t>Classes</a:t>
-            </a:r>
-          </a:p>
-          <a:p>
-            <a:r>
-              <a:rPr lang="en-US" dirty="0" smtClean="0"/>
-              <a:t>Inheritance</a:t>
-            </a:r>
-            <a:endParaRPr lang="en-US" dirty="0"/>
-          </a:p>
-        </p:txBody>
-      </p:sp>
-    </p:spTree>
-    <p:extLst>
-      <p:ext uri="{BB962C8B-B14F-4D97-AF65-F5344CB8AC3E}">
-        <p14:creationId xmlns:p14="http://schemas.microsoft.com/office/powerpoint/2010/main" val="1505561159"/>
-      </p:ext>
-    </p:extLst>
-  </p:cSld>
-  <p:clrMapOvr>
-    <a:masterClrMapping/>
-  </p:clrMapOvr>
-</p:sld>
-</file>
-
-<file path=ppt/slides/slide4.xml><?xml version="1.0" encoding="utf-8"?>
-<p:sld xmlns:a="http://schemas.openxmlformats.org/drawingml/2006/main" xmlns:r="http://schemas.openxmlformats.org/officeDocument/2006/relationships" xmlns:p="http://schemas.openxmlformats.org/presentationml/2006/main">
-  <p:cSld>
-    <p:spTree>
-      <p:nvGrpSpPr>
-        <p:cNvPr id="1" name=""/>
-        <p:cNvGrpSpPr/>
-        <p:nvPr/>
-      </p:nvGrpSpPr>
-      <p:grpSpPr>
-        <a:xfrm>
-          <a:off x="0" y="0"/>
-          <a:ext cx="0" cy="0"/>
-          <a:chOff x="0" y="0"/>
-          <a:chExt cx="0" cy="0"/>
-        </a:xfrm>
-      </p:grpSpPr>
-      <p:sp>
-        <p:nvSpPr>
-          <p:cNvPr id="2" name="Title 1"/>
-          <p:cNvSpPr>
-            <a:spLocks noGrp="1"/>
-          </p:cNvSpPr>
-          <p:nvPr>
-            <p:ph type="title"/>
-          </p:nvPr>
-        </p:nvSpPr>
-        <p:spPr/>
-        <p:txBody>
-          <a:bodyPr/>
-          <a:lstStyle/>
-          <a:p>
-            <a:r>
-              <a:rPr lang="en-US" dirty="0" smtClean="0"/>
-              <a:t>Assignments and Grading </a:t>
-            </a:r>
-            <a:r>
-              <a:rPr lang="en-US" dirty="0"/>
-              <a:t>(tentative)</a:t>
-            </a:r>
-          </a:p>
-        </p:txBody>
-      </p:sp>
-      <p:sp>
-        <p:nvSpPr>
-          <p:cNvPr id="3" name="Content Placeholder 2"/>
-          <p:cNvSpPr>
-            <a:spLocks noGrp="1"/>
-          </p:cNvSpPr>
-          <p:nvPr>
-            <p:ph idx="1"/>
-          </p:nvPr>
-        </p:nvSpPr>
-        <p:spPr/>
-        <p:txBody>
-          <a:bodyPr/>
-          <a:lstStyle/>
-          <a:p>
-            <a:r>
-              <a:rPr lang="en-US" dirty="0" smtClean="0"/>
-              <a:t>Assignments will be given based on pace of class</a:t>
-            </a:r>
-          </a:p>
-          <a:p>
-            <a:r>
-              <a:rPr lang="en-US" dirty="0" smtClean="0"/>
-              <a:t>Homework</a:t>
-            </a:r>
-          </a:p>
-          <a:p>
-            <a:pPr lvl="1"/>
-            <a:r>
-              <a:rPr lang="en-US" dirty="0" smtClean="0"/>
-              <a:t>1-2 assignments per week based on content covered that week</a:t>
-            </a:r>
-          </a:p>
-          <a:p>
-            <a:r>
-              <a:rPr lang="en-US" dirty="0" smtClean="0"/>
-              <a:t>Exams (Very few, if any)</a:t>
-            </a:r>
-          </a:p>
-          <a:p>
-            <a:pPr lvl="1"/>
-            <a:r>
-              <a:rPr lang="en-US" dirty="0" smtClean="0"/>
-              <a:t>Programming is cumulative</a:t>
-            </a:r>
-          </a:p>
-          <a:p>
-            <a:pPr lvl="1"/>
-            <a:r>
-              <a:rPr lang="en-US" dirty="0" smtClean="0"/>
-              <a:t>Homework will provide a good running gauge of progress</a:t>
-            </a:r>
-          </a:p>
-          <a:p>
-            <a:pPr lvl="1"/>
-            <a:endParaRPr lang="en-US" dirty="0"/>
-          </a:p>
-        </p:txBody>
-      </p:sp>
-    </p:spTree>
-    <p:extLst>
-      <p:ext uri="{BB962C8B-B14F-4D97-AF65-F5344CB8AC3E}">
-        <p14:creationId xmlns:p14="http://schemas.microsoft.com/office/powerpoint/2010/main" val="2478916994"/>
-      </p:ext>
-    </p:extLst>
-  </p:cSld>
-  <p:clrMapOvr>
-    <a:masterClrMapping/>
-  </p:clrMapOvr>
-</p:sld>
-</file>
-
-<file path=ppt/slides/slide5.xml><?xml version="1.0" encoding="utf-8"?>
-<p:sld xmlns:a="http://schemas.openxmlformats.org/drawingml/2006/main" xmlns:r="http://schemas.openxmlformats.org/officeDocument/2006/relationships" xmlns:p="http://schemas.openxmlformats.org/presentationml/2006/main">
-  <p:cSld>
-    <p:spTree>
-      <p:nvGrpSpPr>
-        <p:cNvPr id="1" name=""/>
-        <p:cNvGrpSpPr/>
-        <p:nvPr/>
-      </p:nvGrpSpPr>
-      <p:grpSpPr>
-        <a:xfrm>
-          <a:off x="0" y="0"/>
-          <a:ext cx="0" cy="0"/>
-          <a:chOff x="0" y="0"/>
-          <a:chExt cx="0" cy="0"/>
-        </a:xfrm>
-      </p:grpSpPr>
-      <p:sp>
-        <p:nvSpPr>
-          <p:cNvPr id="2" name="Title 1"/>
-          <p:cNvSpPr>
-            <a:spLocks noGrp="1"/>
-          </p:cNvSpPr>
-          <p:nvPr>
-            <p:ph type="title"/>
-          </p:nvPr>
-        </p:nvSpPr>
-        <p:spPr/>
-        <p:txBody>
-          <a:bodyPr/>
-          <a:lstStyle/>
-          <a:p>
-            <a:r>
-              <a:rPr lang="en-US" dirty="0" smtClean="0"/>
-              <a:t>Version Control Systems (VCS)</a:t>
-            </a:r>
-            <a:endParaRPr lang="en-US" dirty="0"/>
-          </a:p>
-        </p:txBody>
-      </p:sp>
-      <p:sp>
-        <p:nvSpPr>
-          <p:cNvPr id="3" name="Content Placeholder 2"/>
-          <p:cNvSpPr>
-            <a:spLocks noGrp="1"/>
-          </p:cNvSpPr>
-          <p:nvPr>
-            <p:ph idx="1"/>
-          </p:nvPr>
-        </p:nvSpPr>
-        <p:spPr/>
-        <p:txBody>
-          <a:bodyPr/>
-          <a:lstStyle/>
-          <a:p>
-            <a:r>
-              <a:rPr lang="en-US" dirty="0" smtClean="0"/>
-              <a:t>Maintain history</a:t>
-            </a:r>
-          </a:p>
-          <a:p>
-            <a:r>
-              <a:rPr lang="en-US" dirty="0" smtClean="0"/>
-              <a:t>Histories are stored in repositories</a:t>
-            </a:r>
-          </a:p>
-          <a:p>
-            <a:r>
-              <a:rPr lang="en-US" dirty="0" smtClean="0"/>
-              <a:t>Each “event”(commit) in the history contains:</a:t>
-            </a:r>
-          </a:p>
-          <a:p>
-            <a:pPr lvl="1"/>
-            <a:r>
-              <a:rPr lang="en-US" dirty="0" smtClean="0"/>
-              <a:t>Who made the change</a:t>
-            </a:r>
-          </a:p>
-          <a:p>
-            <a:pPr lvl="1"/>
-            <a:r>
-              <a:rPr lang="en-US" dirty="0" smtClean="0"/>
-              <a:t>What was changed</a:t>
-            </a:r>
-          </a:p>
-          <a:p>
-            <a:pPr lvl="1"/>
-            <a:r>
-              <a:rPr lang="en-US" dirty="0" smtClean="0"/>
-              <a:t>When the change was made</a:t>
-            </a:r>
-          </a:p>
-          <a:p>
-            <a:pPr lvl="1"/>
-            <a:r>
-              <a:rPr lang="en-US" dirty="0" smtClean="0"/>
-              <a:t>Why the change was made</a:t>
-            </a:r>
-          </a:p>
-          <a:p>
-            <a:pPr lvl="1"/>
-            <a:endParaRPr lang="en-US" dirty="0" smtClean="0"/>
-          </a:p>
-          <a:p>
-            <a:pPr lvl="1"/>
-            <a:endParaRPr lang="en-US" dirty="0" smtClean="0"/>
-          </a:p>
-        </p:txBody>
-      </p:sp>
-    </p:spTree>
-    <p:extLst>
-      <p:ext uri="{BB962C8B-B14F-4D97-AF65-F5344CB8AC3E}">
-        <p14:creationId xmlns:p14="http://schemas.microsoft.com/office/powerpoint/2010/main" val="971770510"/>
-      </p:ext>
-    </p:extLst>
-  </p:cSld>
-  <p:clrMapOvr>
-    <a:masterClrMapping/>
-  </p:clrMapOvr>
-</p:sld>
-</file>
-
-<file path=ppt/slides/slide6.xml><?xml version="1.0" encoding="utf-8"?>
-<p:sld xmlns:a="http://schemas.openxmlformats.org/drawingml/2006/main" xmlns:r="http://schemas.openxmlformats.org/officeDocument/2006/relationships" xmlns:p="http://schemas.openxmlformats.org/presentationml/2006/main">
-  <p:cSld>
-    <p:spTree>
-      <p:nvGrpSpPr>
-        <p:cNvPr id="1" name=""/>
-        <p:cNvGrpSpPr/>
-        <p:nvPr/>
-      </p:nvGrpSpPr>
-      <p:grpSpPr>
-        <a:xfrm>
-          <a:off x="0" y="0"/>
-          <a:ext cx="0" cy="0"/>
-          <a:chOff x="0" y="0"/>
-          <a:chExt cx="0" cy="0"/>
-        </a:xfrm>
-      </p:grpSpPr>
-      <p:sp>
-        <p:nvSpPr>
-          <p:cNvPr id="2" name="Title 1"/>
-          <p:cNvSpPr>
-            <a:spLocks noGrp="1"/>
-          </p:cNvSpPr>
-          <p:nvPr>
-            <p:ph type="title"/>
-          </p:nvPr>
-        </p:nvSpPr>
-        <p:spPr/>
-        <p:txBody>
-          <a:bodyPr/>
-          <a:lstStyle/>
-          <a:p>
-            <a:r>
-              <a:rPr lang="en-US" dirty="0" err="1" smtClean="0"/>
-              <a:t>Git</a:t>
-            </a:r>
-            <a:r>
-              <a:rPr lang="en-US" dirty="0"/>
-              <a:t>:</a:t>
-            </a:r>
-            <a:r>
-              <a:rPr lang="en-US" dirty="0" smtClean="0"/>
-              <a:t> a Distributed VCS</a:t>
-            </a:r>
-            <a:endParaRPr lang="en-US" dirty="0"/>
-          </a:p>
-        </p:txBody>
-      </p:sp>
-      <p:sp>
-        <p:nvSpPr>
-          <p:cNvPr id="3" name="Content Placeholder 2"/>
-          <p:cNvSpPr>
-            <a:spLocks noGrp="1"/>
-          </p:cNvSpPr>
-          <p:nvPr>
-            <p:ph idx="1"/>
-          </p:nvPr>
-        </p:nvSpPr>
-        <p:spPr/>
-        <p:txBody>
-          <a:bodyPr/>
-          <a:lstStyle/>
-          <a:p>
-            <a:r>
-              <a:rPr lang="en-US" dirty="0" smtClean="0"/>
-              <a:t>Each workspace maintains it own history</a:t>
-            </a:r>
-          </a:p>
-          <a:p>
-            <a:r>
-              <a:rPr lang="en-US" dirty="0" smtClean="0"/>
-              <a:t>Commits are made to the local workspace’s history</a:t>
-            </a:r>
-          </a:p>
-          <a:p>
-            <a:r>
-              <a:rPr lang="en-US" dirty="0" smtClean="0"/>
-              <a:t>Commits are then “pushed” and “pulled” between workspaces</a:t>
-            </a:r>
-          </a:p>
-        </p:txBody>
-      </p:sp>
-    </p:spTree>
-    <p:extLst>
-      <p:ext uri="{BB962C8B-B14F-4D97-AF65-F5344CB8AC3E}">
-        <p14:creationId xmlns:p14="http://schemas.microsoft.com/office/powerpoint/2010/main" val="3746893934"/>
-      </p:ext>
-    </p:extLst>
-  </p:cSld>
-  <p:clrMapOvr>
-    <a:masterClrMapping/>
-  </p:clrMapOvr>
-</p:sld>
-</file>
-
-<file path=ppt/slides/slide7.xml><?xml version="1.0" encoding="utf-8"?>
-<p:sld xmlns:a="http://schemas.openxmlformats.org/drawingml/2006/main" xmlns:r="http://schemas.openxmlformats.org/officeDocument/2006/relationships" xmlns:p="http://schemas.openxmlformats.org/presentationml/2006/main">
-  <p:cSld>
-    <p:spTree>
-      <p:nvGrpSpPr>
-        <p:cNvPr id="1" name=""/>
-        <p:cNvGrpSpPr/>
-        <p:nvPr/>
-      </p:nvGrpSpPr>
-      <p:grpSpPr>
-        <a:xfrm>
-          <a:off x="0" y="0"/>
-          <a:ext cx="0" cy="0"/>
-          <a:chOff x="0" y="0"/>
-          <a:chExt cx="0" cy="0"/>
-        </a:xfrm>
-      </p:grpSpPr>
-      <p:sp>
-        <p:nvSpPr>
-          <p:cNvPr id="2" name="Title 1"/>
-          <p:cNvSpPr>
-            <a:spLocks noGrp="1"/>
-          </p:cNvSpPr>
-          <p:nvPr>
-            <p:ph type="title"/>
-          </p:nvPr>
-        </p:nvSpPr>
-        <p:spPr/>
-        <p:txBody>
-          <a:bodyPr/>
-          <a:lstStyle/>
-          <a:p>
-            <a:r>
-              <a:rPr lang="en-US" dirty="0" err="1" smtClean="0"/>
-              <a:t>Github</a:t>
-            </a:r>
-            <a:endParaRPr lang="en-US" dirty="0"/>
-          </a:p>
-        </p:txBody>
-      </p:sp>
-      <p:sp>
-        <p:nvSpPr>
-          <p:cNvPr id="3" name="Content Placeholder 2"/>
-          <p:cNvSpPr>
-            <a:spLocks noGrp="1"/>
-          </p:cNvSpPr>
-          <p:nvPr>
-            <p:ph idx="1"/>
-          </p:nvPr>
-        </p:nvSpPr>
-        <p:spPr/>
-        <p:txBody>
-          <a:bodyPr/>
-          <a:lstStyle/>
-          <a:p>
-            <a:r>
-              <a:rPr lang="en-US" dirty="0" smtClean="0"/>
-              <a:t>“Central” repository where </a:t>
-            </a:r>
-            <a:r>
-              <a:rPr lang="en-US" dirty="0" err="1" smtClean="0"/>
-              <a:t>git</a:t>
-            </a:r>
-            <a:r>
-              <a:rPr lang="en-US" dirty="0" smtClean="0"/>
-              <a:t> repositories are hosted</a:t>
-            </a:r>
-          </a:p>
-          <a:p>
-            <a:pPr lvl="1"/>
-            <a:r>
-              <a:rPr lang="en-US" dirty="0" smtClean="0"/>
-              <a:t>Not the only </a:t>
-            </a:r>
-            <a:r>
-              <a:rPr lang="en-US" dirty="0" err="1" smtClean="0"/>
-              <a:t>git</a:t>
-            </a:r>
-            <a:r>
-              <a:rPr lang="en-US" dirty="0" smtClean="0"/>
-              <a:t> hosting platform, just a very popular one</a:t>
-            </a:r>
-            <a:endParaRPr lang="en-US" dirty="0"/>
-          </a:p>
-        </p:txBody>
-      </p:sp>
-    </p:spTree>
-    <p:extLst>
-      <p:ext uri="{BB962C8B-B14F-4D97-AF65-F5344CB8AC3E}">
-        <p14:creationId xmlns:p14="http://schemas.microsoft.com/office/powerpoint/2010/main" val="505577709"/>
-      </p:ext>
-    </p:extLst>
-  </p:cSld>
-  <p:clrMapOvr>
-    <a:masterClrMapping/>
-  </p:clrMapOvr>
-</p:sld>
-</file>
-
-<file path=ppt/slides/slide8.xml><?xml version="1.0" encoding="utf-8"?>
-<p:sld xmlns:a="http://schemas.openxmlformats.org/drawingml/2006/main" xmlns:r="http://schemas.openxmlformats.org/officeDocument/2006/relationships" xmlns:p="http://schemas.openxmlformats.org/presentationml/2006/main">
-  <p:cSld>
-    <p:spTree>
-      <p:nvGrpSpPr>
-        <p:cNvPr id="1" name=""/>
-        <p:cNvGrpSpPr/>
-        <p:nvPr/>
-      </p:nvGrpSpPr>
-      <p:grpSpPr>
-        <a:xfrm>
-          <a:off x="0" y="0"/>
-          <a:ext cx="0" cy="0"/>
-          <a:chOff x="0" y="0"/>
-          <a:chExt cx="0" cy="0"/>
-        </a:xfrm>
-      </p:grpSpPr>
-      <p:sp>
-        <p:nvSpPr>
-          <p:cNvPr id="2" name="Title 1"/>
-          <p:cNvSpPr>
-            <a:spLocks noGrp="1"/>
-          </p:cNvSpPr>
-          <p:nvPr>
-            <p:ph type="title"/>
-          </p:nvPr>
-        </p:nvSpPr>
-        <p:spPr/>
-        <p:txBody>
-          <a:bodyPr/>
-          <a:lstStyle/>
-          <a:p>
-            <a:r>
-              <a:rPr lang="en-US" dirty="0" smtClean="0"/>
-              <a:t>Retrieving the presentation repository</a:t>
-            </a:r>
-            <a:endParaRPr lang="en-US" dirty="0"/>
-          </a:p>
-        </p:txBody>
-      </p:sp>
-      <p:pic>
-        <p:nvPicPr>
-          <p:cNvPr id="4" name="Content Placeholder 3"/>
-          <p:cNvPicPr>
-            <a:picLocks noGrp="1" noChangeAspect="1"/>
-          </p:cNvPicPr>
-          <p:nvPr>
-            <p:ph idx="1"/>
-          </p:nvPr>
-        </p:nvPicPr>
-        <p:blipFill>
-          <a:blip r:embed="rId2">
-            <a:extLst>
-              <a:ext uri="{28A0092B-C50C-407E-A947-70E740481C1C}">
-                <a14:useLocalDpi xmlns:a14="http://schemas.microsoft.com/office/drawing/2010/main" val="0"/>
-              </a:ext>
-            </a:extLst>
-          </a:blip>
-          <a:stretch>
-            <a:fillRect/>
-          </a:stretch>
-        </p:blipFill>
-        <p:spPr>
-          <a:xfrm>
-            <a:off x="3602412" y="2052638"/>
-            <a:ext cx="3948952" cy="4195762"/>
-          </a:xfrm>
-        </p:spPr>
-      </p:pic>
-    </p:spTree>
-    <p:extLst>
-      <p:ext uri="{BB962C8B-B14F-4D97-AF65-F5344CB8AC3E}">
-        <p14:creationId xmlns:p14="http://schemas.microsoft.com/office/powerpoint/2010/main" val="1134168775"/>
-      </p:ext>
-    </p:extLst>
-  </p:cSld>
-  <p:clrMapOvr>
-    <a:masterClrMapping/>
-  </p:clrMapOvr>
-</p:sld>
-</file>
-
-<file path=ppt/slides/slide9.xml><?xml version="1.0" encoding="utf-8"?>
+<file path=ppt/slides/slide10.xml><?xml version="1.0" encoding="utf-8"?>
 <p:sld xmlns:a="http://schemas.openxmlformats.org/drawingml/2006/main" xmlns:r="http://schemas.openxmlformats.org/officeDocument/2006/relationships" xmlns:p="http://schemas.openxmlformats.org/presentationml/2006/main">
   <p:cSld>
     <p:spTree>
@@ -6893,6 +6169,811 @@
     <p:extLst>
       <p:ext uri="{BB962C8B-B14F-4D97-AF65-F5344CB8AC3E}">
         <p14:creationId xmlns:p14="http://schemas.microsoft.com/office/powerpoint/2010/main" val="214715443"/>
+      </p:ext>
+    </p:extLst>
+  </p:cSld>
+  <p:clrMapOvr>
+    <a:masterClrMapping/>
+  </p:clrMapOvr>
+</p:sld>
+</file>
+
+<file path=ppt/slides/slide2.xml><?xml version="1.0" encoding="utf-8"?>
+<p:sld xmlns:a="http://schemas.openxmlformats.org/drawingml/2006/main" xmlns:r="http://schemas.openxmlformats.org/officeDocument/2006/relationships" xmlns:p="http://schemas.openxmlformats.org/presentationml/2006/main">
+  <p:cSld>
+    <p:spTree>
+      <p:nvGrpSpPr>
+        <p:cNvPr id="1" name=""/>
+        <p:cNvGrpSpPr/>
+        <p:nvPr/>
+      </p:nvGrpSpPr>
+      <p:grpSpPr>
+        <a:xfrm>
+          <a:off x="0" y="0"/>
+          <a:ext cx="0" cy="0"/>
+          <a:chOff x="0" y="0"/>
+          <a:chExt cx="0" cy="0"/>
+        </a:xfrm>
+      </p:grpSpPr>
+      <p:sp>
+        <p:nvSpPr>
+          <p:cNvPr id="2" name="Title 1"/>
+          <p:cNvSpPr>
+            <a:spLocks noGrp="1"/>
+          </p:cNvSpPr>
+          <p:nvPr>
+            <p:ph type="title"/>
+          </p:nvPr>
+        </p:nvSpPr>
+        <p:spPr/>
+        <p:txBody>
+          <a:bodyPr/>
+          <a:lstStyle/>
+          <a:p>
+            <a:r>
+              <a:rPr lang="en-US" dirty="0" smtClean="0"/>
+              <a:t>Topics to Cover</a:t>
+            </a:r>
+            <a:endParaRPr lang="en-US" dirty="0"/>
+          </a:p>
+        </p:txBody>
+      </p:sp>
+      <p:sp>
+        <p:nvSpPr>
+          <p:cNvPr id="3" name="Content Placeholder 2"/>
+          <p:cNvSpPr>
+            <a:spLocks noGrp="1"/>
+          </p:cNvSpPr>
+          <p:nvPr>
+            <p:ph idx="1"/>
+          </p:nvPr>
+        </p:nvSpPr>
+        <p:spPr/>
+        <p:txBody>
+          <a:bodyPr>
+            <a:normAutofit/>
+          </a:bodyPr>
+          <a:lstStyle/>
+          <a:p>
+            <a:r>
+              <a:rPr lang="en-US" dirty="0"/>
+              <a:t>Java “Hello World</a:t>
+            </a:r>
+            <a:r>
+              <a:rPr lang="en-US" dirty="0" smtClean="0"/>
+              <a:t>”</a:t>
+            </a:r>
+            <a:endParaRPr lang="en-US" dirty="0" smtClean="0"/>
+          </a:p>
+          <a:p>
+            <a:r>
+              <a:rPr lang="en-US" dirty="0" err="1" smtClean="0"/>
+              <a:t>Git</a:t>
+            </a:r>
+            <a:r>
+              <a:rPr lang="en-US" dirty="0" smtClean="0"/>
+              <a:t>/VCS</a:t>
+            </a:r>
+            <a:endParaRPr lang="en-US" dirty="0" smtClean="0"/>
+          </a:p>
+          <a:p>
+            <a:r>
+              <a:rPr lang="en-US" dirty="0" smtClean="0"/>
+              <a:t>Variables </a:t>
+            </a:r>
+            <a:r>
+              <a:rPr lang="en-US" dirty="0" smtClean="0"/>
+              <a:t>and Types</a:t>
+            </a:r>
+          </a:p>
+          <a:p>
+            <a:r>
+              <a:rPr lang="en-US" dirty="0" smtClean="0"/>
+              <a:t>Basic Operations</a:t>
+            </a:r>
+          </a:p>
+          <a:p>
+            <a:pPr lvl="1"/>
+            <a:r>
+              <a:rPr lang="en-US" dirty="0" smtClean="0"/>
+              <a:t>+ - * /</a:t>
+            </a:r>
+          </a:p>
+          <a:p>
+            <a:r>
+              <a:rPr lang="en-US" dirty="0" smtClean="0"/>
+              <a:t>Functions</a:t>
+            </a:r>
+          </a:p>
+          <a:p>
+            <a:r>
+              <a:rPr lang="en-US" dirty="0" smtClean="0"/>
+              <a:t>While Loops</a:t>
+            </a:r>
+          </a:p>
+          <a:p>
+            <a:r>
+              <a:rPr lang="en-US" dirty="0" smtClean="0"/>
+              <a:t>For Loops</a:t>
+            </a:r>
+          </a:p>
+          <a:p>
+            <a:r>
+              <a:rPr lang="en-US" dirty="0" smtClean="0"/>
+              <a:t>Collections</a:t>
+            </a:r>
+            <a:endParaRPr lang="en-US" dirty="0"/>
+          </a:p>
+        </p:txBody>
+      </p:sp>
+    </p:spTree>
+    <p:extLst>
+      <p:ext uri="{BB962C8B-B14F-4D97-AF65-F5344CB8AC3E}">
+        <p14:creationId xmlns:p14="http://schemas.microsoft.com/office/powerpoint/2010/main" val="2999560502"/>
+      </p:ext>
+    </p:extLst>
+  </p:cSld>
+  <p:clrMapOvr>
+    <a:masterClrMapping/>
+  </p:clrMapOvr>
+</p:sld>
+</file>
+
+<file path=ppt/slides/slide3.xml><?xml version="1.0" encoding="utf-8"?>
+<p:sld xmlns:a="http://schemas.openxmlformats.org/drawingml/2006/main" xmlns:r="http://schemas.openxmlformats.org/officeDocument/2006/relationships" xmlns:p="http://schemas.openxmlformats.org/presentationml/2006/main">
+  <p:cSld>
+    <p:spTree>
+      <p:nvGrpSpPr>
+        <p:cNvPr id="1" name=""/>
+        <p:cNvGrpSpPr/>
+        <p:nvPr/>
+      </p:nvGrpSpPr>
+      <p:grpSpPr>
+        <a:xfrm>
+          <a:off x="0" y="0"/>
+          <a:ext cx="0" cy="0"/>
+          <a:chOff x="0" y="0"/>
+          <a:chExt cx="0" cy="0"/>
+        </a:xfrm>
+      </p:grpSpPr>
+      <p:sp>
+        <p:nvSpPr>
+          <p:cNvPr id="2" name="Title 1"/>
+          <p:cNvSpPr>
+            <a:spLocks noGrp="1"/>
+          </p:cNvSpPr>
+          <p:nvPr>
+            <p:ph type="title"/>
+          </p:nvPr>
+        </p:nvSpPr>
+        <p:spPr/>
+        <p:txBody>
+          <a:bodyPr/>
+          <a:lstStyle/>
+          <a:p>
+            <a:r>
+              <a:rPr lang="en-US" dirty="0" smtClean="0"/>
+              <a:t>Topics to Cover (cont.)</a:t>
+            </a:r>
+            <a:endParaRPr lang="en-US" dirty="0"/>
+          </a:p>
+        </p:txBody>
+      </p:sp>
+      <p:sp>
+        <p:nvSpPr>
+          <p:cNvPr id="3" name="Content Placeholder 2"/>
+          <p:cNvSpPr>
+            <a:spLocks noGrp="1"/>
+          </p:cNvSpPr>
+          <p:nvPr>
+            <p:ph idx="1"/>
+          </p:nvPr>
+        </p:nvSpPr>
+        <p:spPr/>
+        <p:txBody>
+          <a:bodyPr/>
+          <a:lstStyle/>
+          <a:p>
+            <a:r>
+              <a:rPr lang="en-US" dirty="0" smtClean="0"/>
+              <a:t>Classes</a:t>
+            </a:r>
+          </a:p>
+          <a:p>
+            <a:r>
+              <a:rPr lang="en-US" dirty="0" smtClean="0"/>
+              <a:t>Inheritance</a:t>
+            </a:r>
+            <a:endParaRPr lang="en-US" dirty="0"/>
+          </a:p>
+        </p:txBody>
+      </p:sp>
+    </p:spTree>
+    <p:extLst>
+      <p:ext uri="{BB962C8B-B14F-4D97-AF65-F5344CB8AC3E}">
+        <p14:creationId xmlns:p14="http://schemas.microsoft.com/office/powerpoint/2010/main" val="1505561159"/>
+      </p:ext>
+    </p:extLst>
+  </p:cSld>
+  <p:clrMapOvr>
+    <a:masterClrMapping/>
+  </p:clrMapOvr>
+</p:sld>
+</file>
+
+<file path=ppt/slides/slide4.xml><?xml version="1.0" encoding="utf-8"?>
+<p:sld xmlns:a="http://schemas.openxmlformats.org/drawingml/2006/main" xmlns:r="http://schemas.openxmlformats.org/officeDocument/2006/relationships" xmlns:p="http://schemas.openxmlformats.org/presentationml/2006/main">
+  <p:cSld>
+    <p:spTree>
+      <p:nvGrpSpPr>
+        <p:cNvPr id="1" name=""/>
+        <p:cNvGrpSpPr/>
+        <p:nvPr/>
+      </p:nvGrpSpPr>
+      <p:grpSpPr>
+        <a:xfrm>
+          <a:off x="0" y="0"/>
+          <a:ext cx="0" cy="0"/>
+          <a:chOff x="0" y="0"/>
+          <a:chExt cx="0" cy="0"/>
+        </a:xfrm>
+      </p:grpSpPr>
+      <p:sp>
+        <p:nvSpPr>
+          <p:cNvPr id="2" name="Title 1"/>
+          <p:cNvSpPr>
+            <a:spLocks noGrp="1"/>
+          </p:cNvSpPr>
+          <p:nvPr>
+            <p:ph type="title"/>
+          </p:nvPr>
+        </p:nvSpPr>
+        <p:spPr/>
+        <p:txBody>
+          <a:bodyPr/>
+          <a:lstStyle/>
+          <a:p>
+            <a:r>
+              <a:rPr lang="en-US" dirty="0" smtClean="0"/>
+              <a:t>Assignments and Grading </a:t>
+            </a:r>
+            <a:r>
+              <a:rPr lang="en-US" dirty="0"/>
+              <a:t>(tentative)</a:t>
+            </a:r>
+          </a:p>
+        </p:txBody>
+      </p:sp>
+      <p:sp>
+        <p:nvSpPr>
+          <p:cNvPr id="3" name="Content Placeholder 2"/>
+          <p:cNvSpPr>
+            <a:spLocks noGrp="1"/>
+          </p:cNvSpPr>
+          <p:nvPr>
+            <p:ph idx="1"/>
+          </p:nvPr>
+        </p:nvSpPr>
+        <p:spPr/>
+        <p:txBody>
+          <a:bodyPr/>
+          <a:lstStyle/>
+          <a:p>
+            <a:r>
+              <a:rPr lang="en-US" dirty="0" smtClean="0"/>
+              <a:t>Assignments will be given based on pace of class</a:t>
+            </a:r>
+          </a:p>
+          <a:p>
+            <a:r>
+              <a:rPr lang="en-US" dirty="0" smtClean="0"/>
+              <a:t>Homework</a:t>
+            </a:r>
+          </a:p>
+          <a:p>
+            <a:pPr lvl="1"/>
+            <a:r>
+              <a:rPr lang="en-US" dirty="0" smtClean="0"/>
+              <a:t>1-2 assignments per week based on content covered that week</a:t>
+            </a:r>
+          </a:p>
+          <a:p>
+            <a:r>
+              <a:rPr lang="en-US" dirty="0" smtClean="0"/>
+              <a:t>Exams (Very few, if any)</a:t>
+            </a:r>
+          </a:p>
+          <a:p>
+            <a:pPr lvl="1"/>
+            <a:r>
+              <a:rPr lang="en-US" dirty="0" smtClean="0"/>
+              <a:t>Programming is cumulative</a:t>
+            </a:r>
+          </a:p>
+          <a:p>
+            <a:pPr lvl="1"/>
+            <a:r>
+              <a:rPr lang="en-US" dirty="0" smtClean="0"/>
+              <a:t>Homework will provide a good running gauge of progress</a:t>
+            </a:r>
+          </a:p>
+          <a:p>
+            <a:pPr lvl="1"/>
+            <a:endParaRPr lang="en-US" dirty="0"/>
+          </a:p>
+        </p:txBody>
+      </p:sp>
+    </p:spTree>
+    <p:extLst>
+      <p:ext uri="{BB962C8B-B14F-4D97-AF65-F5344CB8AC3E}">
+        <p14:creationId xmlns:p14="http://schemas.microsoft.com/office/powerpoint/2010/main" val="2478916994"/>
+      </p:ext>
+    </p:extLst>
+  </p:cSld>
+  <p:clrMapOvr>
+    <a:masterClrMapping/>
+  </p:clrMapOvr>
+</p:sld>
+</file>
+
+<file path=ppt/slides/slide5.xml><?xml version="1.0" encoding="utf-8"?>
+<p:sld xmlns:a="http://schemas.openxmlformats.org/drawingml/2006/main" xmlns:r="http://schemas.openxmlformats.org/officeDocument/2006/relationships" xmlns:p="http://schemas.openxmlformats.org/presentationml/2006/main">
+  <p:cSld>
+    <p:spTree>
+      <p:nvGrpSpPr>
+        <p:cNvPr id="1" name=""/>
+        <p:cNvGrpSpPr/>
+        <p:nvPr/>
+      </p:nvGrpSpPr>
+      <p:grpSpPr>
+        <a:xfrm>
+          <a:off x="0" y="0"/>
+          <a:ext cx="0" cy="0"/>
+          <a:chOff x="0" y="0"/>
+          <a:chExt cx="0" cy="0"/>
+        </a:xfrm>
+      </p:grpSpPr>
+      <p:sp>
+        <p:nvSpPr>
+          <p:cNvPr id="2" name="Title 1"/>
+          <p:cNvSpPr>
+            <a:spLocks noGrp="1"/>
+          </p:cNvSpPr>
+          <p:nvPr>
+            <p:ph type="title"/>
+          </p:nvPr>
+        </p:nvSpPr>
+        <p:spPr/>
+        <p:txBody>
+          <a:bodyPr/>
+          <a:lstStyle/>
+          <a:p>
+            <a:r>
+              <a:rPr lang="en-US" dirty="0" smtClean="0"/>
+              <a:t>Class Homepage</a:t>
+            </a:r>
+            <a:endParaRPr lang="en-US" dirty="0"/>
+          </a:p>
+        </p:txBody>
+      </p:sp>
+      <p:sp>
+        <p:nvSpPr>
+          <p:cNvPr id="3" name="Content Placeholder 2"/>
+          <p:cNvSpPr>
+            <a:spLocks noGrp="1"/>
+          </p:cNvSpPr>
+          <p:nvPr>
+            <p:ph idx="1"/>
+          </p:nvPr>
+        </p:nvSpPr>
+        <p:spPr/>
+        <p:txBody>
+          <a:bodyPr/>
+          <a:lstStyle/>
+          <a:p>
+            <a:r>
+              <a:rPr lang="en-US" dirty="0"/>
+              <a:t>https://github.com/HCA-Java-2015</a:t>
+            </a:r>
+          </a:p>
+        </p:txBody>
+      </p:sp>
+    </p:spTree>
+    <p:extLst>
+      <p:ext uri="{BB962C8B-B14F-4D97-AF65-F5344CB8AC3E}">
+        <p14:creationId xmlns:p14="http://schemas.microsoft.com/office/powerpoint/2010/main" val="518513511"/>
+      </p:ext>
+    </p:extLst>
+  </p:cSld>
+  <p:clrMapOvr>
+    <a:masterClrMapping/>
+  </p:clrMapOvr>
+</p:sld>
+</file>
+
+<file path=ppt/slides/slide6.xml><?xml version="1.0" encoding="utf-8"?>
+<p:sld xmlns:a="http://schemas.openxmlformats.org/drawingml/2006/main" xmlns:r="http://schemas.openxmlformats.org/officeDocument/2006/relationships" xmlns:p="http://schemas.openxmlformats.org/presentationml/2006/main">
+  <p:cSld>
+    <p:spTree>
+      <p:nvGrpSpPr>
+        <p:cNvPr id="1" name=""/>
+        <p:cNvGrpSpPr/>
+        <p:nvPr/>
+      </p:nvGrpSpPr>
+      <p:grpSpPr>
+        <a:xfrm>
+          <a:off x="0" y="0"/>
+          <a:ext cx="0" cy="0"/>
+          <a:chOff x="0" y="0"/>
+          <a:chExt cx="0" cy="0"/>
+        </a:xfrm>
+      </p:grpSpPr>
+      <p:sp>
+        <p:nvSpPr>
+          <p:cNvPr id="2" name="Title 1"/>
+          <p:cNvSpPr>
+            <a:spLocks noGrp="1"/>
+          </p:cNvSpPr>
+          <p:nvPr>
+            <p:ph type="title"/>
+          </p:nvPr>
+        </p:nvSpPr>
+        <p:spPr/>
+        <p:txBody>
+          <a:bodyPr/>
+          <a:lstStyle/>
+          <a:p>
+            <a:r>
+              <a:rPr lang="en-US" dirty="0" smtClean="0"/>
+              <a:t>Hello World Example</a:t>
+            </a:r>
+            <a:endParaRPr lang="en-US" dirty="0"/>
+          </a:p>
+        </p:txBody>
+      </p:sp>
+      <p:sp>
+        <p:nvSpPr>
+          <p:cNvPr id="3" name="Content Placeholder 2"/>
+          <p:cNvSpPr>
+            <a:spLocks noGrp="1"/>
+          </p:cNvSpPr>
+          <p:nvPr>
+            <p:ph idx="1"/>
+          </p:nvPr>
+        </p:nvSpPr>
+        <p:spPr/>
+        <p:txBody>
+          <a:bodyPr/>
+          <a:lstStyle/>
+          <a:p>
+            <a:pPr marL="0" indent="0">
+              <a:buNone/>
+            </a:pPr>
+            <a:endParaRPr lang="en-US" dirty="0"/>
+          </a:p>
+        </p:txBody>
+      </p:sp>
+    </p:spTree>
+    <p:extLst>
+      <p:ext uri="{BB962C8B-B14F-4D97-AF65-F5344CB8AC3E}">
+        <p14:creationId xmlns:p14="http://schemas.microsoft.com/office/powerpoint/2010/main" val="2764591865"/>
+      </p:ext>
+    </p:extLst>
+  </p:cSld>
+  <p:clrMapOvr>
+    <a:masterClrMapping/>
+  </p:clrMapOvr>
+</p:sld>
+</file>
+
+<file path=ppt/slides/slide7.xml><?xml version="1.0" encoding="utf-8"?>
+<p:sld xmlns:a="http://schemas.openxmlformats.org/drawingml/2006/main" xmlns:r="http://schemas.openxmlformats.org/officeDocument/2006/relationships" xmlns:p="http://schemas.openxmlformats.org/presentationml/2006/main">
+  <p:cSld>
+    <p:spTree>
+      <p:nvGrpSpPr>
+        <p:cNvPr id="1" name=""/>
+        <p:cNvGrpSpPr/>
+        <p:nvPr/>
+      </p:nvGrpSpPr>
+      <p:grpSpPr>
+        <a:xfrm>
+          <a:off x="0" y="0"/>
+          <a:ext cx="0" cy="0"/>
+          <a:chOff x="0" y="0"/>
+          <a:chExt cx="0" cy="0"/>
+        </a:xfrm>
+      </p:grpSpPr>
+      <p:sp>
+        <p:nvSpPr>
+          <p:cNvPr id="2" name="Title 1"/>
+          <p:cNvSpPr>
+            <a:spLocks noGrp="1"/>
+          </p:cNvSpPr>
+          <p:nvPr>
+            <p:ph type="title"/>
+          </p:nvPr>
+        </p:nvSpPr>
+        <p:spPr/>
+        <p:txBody>
+          <a:bodyPr/>
+          <a:lstStyle/>
+          <a:p>
+            <a:r>
+              <a:rPr lang="en-US" dirty="0" smtClean="0"/>
+              <a:t>Version Control Systems (VCS)</a:t>
+            </a:r>
+            <a:endParaRPr lang="en-US" dirty="0"/>
+          </a:p>
+        </p:txBody>
+      </p:sp>
+      <p:sp>
+        <p:nvSpPr>
+          <p:cNvPr id="3" name="Content Placeholder 2"/>
+          <p:cNvSpPr>
+            <a:spLocks noGrp="1"/>
+          </p:cNvSpPr>
+          <p:nvPr>
+            <p:ph idx="1"/>
+          </p:nvPr>
+        </p:nvSpPr>
+        <p:spPr/>
+        <p:txBody>
+          <a:bodyPr/>
+          <a:lstStyle/>
+          <a:p>
+            <a:r>
+              <a:rPr lang="en-US" dirty="0" smtClean="0"/>
+              <a:t>Maintain history</a:t>
+            </a:r>
+          </a:p>
+          <a:p>
+            <a:r>
+              <a:rPr lang="en-US" dirty="0" smtClean="0"/>
+              <a:t>Histories are stored in repositories</a:t>
+            </a:r>
+          </a:p>
+          <a:p>
+            <a:r>
+              <a:rPr lang="en-US" dirty="0" smtClean="0"/>
+              <a:t>Each “event”(commit) in the history contains:</a:t>
+            </a:r>
+          </a:p>
+          <a:p>
+            <a:pPr lvl="1"/>
+            <a:r>
+              <a:rPr lang="en-US" dirty="0" smtClean="0"/>
+              <a:t>Who made the change</a:t>
+            </a:r>
+          </a:p>
+          <a:p>
+            <a:pPr lvl="1"/>
+            <a:r>
+              <a:rPr lang="en-US" dirty="0" smtClean="0"/>
+              <a:t>What was changed</a:t>
+            </a:r>
+          </a:p>
+          <a:p>
+            <a:pPr lvl="1"/>
+            <a:r>
+              <a:rPr lang="en-US" dirty="0" smtClean="0"/>
+              <a:t>When the change was made</a:t>
+            </a:r>
+          </a:p>
+          <a:p>
+            <a:pPr lvl="1"/>
+            <a:r>
+              <a:rPr lang="en-US" dirty="0" smtClean="0"/>
+              <a:t>Why the change was made</a:t>
+            </a:r>
+          </a:p>
+          <a:p>
+            <a:pPr lvl="1"/>
+            <a:endParaRPr lang="en-US" dirty="0" smtClean="0"/>
+          </a:p>
+          <a:p>
+            <a:pPr lvl="1"/>
+            <a:endParaRPr lang="en-US" dirty="0" smtClean="0"/>
+          </a:p>
+        </p:txBody>
+      </p:sp>
+    </p:spTree>
+    <p:extLst>
+      <p:ext uri="{BB962C8B-B14F-4D97-AF65-F5344CB8AC3E}">
+        <p14:creationId xmlns:p14="http://schemas.microsoft.com/office/powerpoint/2010/main" val="971770510"/>
+      </p:ext>
+    </p:extLst>
+  </p:cSld>
+  <p:clrMapOvr>
+    <a:masterClrMapping/>
+  </p:clrMapOvr>
+</p:sld>
+</file>
+
+<file path=ppt/slides/slide8.xml><?xml version="1.0" encoding="utf-8"?>
+<p:sld xmlns:a="http://schemas.openxmlformats.org/drawingml/2006/main" xmlns:r="http://schemas.openxmlformats.org/officeDocument/2006/relationships" xmlns:p="http://schemas.openxmlformats.org/presentationml/2006/main">
+  <p:cSld>
+    <p:spTree>
+      <p:nvGrpSpPr>
+        <p:cNvPr id="1" name=""/>
+        <p:cNvGrpSpPr/>
+        <p:nvPr/>
+      </p:nvGrpSpPr>
+      <p:grpSpPr>
+        <a:xfrm>
+          <a:off x="0" y="0"/>
+          <a:ext cx="0" cy="0"/>
+          <a:chOff x="0" y="0"/>
+          <a:chExt cx="0" cy="0"/>
+        </a:xfrm>
+      </p:grpSpPr>
+      <p:sp>
+        <p:nvSpPr>
+          <p:cNvPr id="2" name="Title 1"/>
+          <p:cNvSpPr>
+            <a:spLocks noGrp="1"/>
+          </p:cNvSpPr>
+          <p:nvPr>
+            <p:ph type="title"/>
+          </p:nvPr>
+        </p:nvSpPr>
+        <p:spPr/>
+        <p:txBody>
+          <a:bodyPr/>
+          <a:lstStyle/>
+          <a:p>
+            <a:r>
+              <a:rPr lang="en-US" dirty="0" err="1" smtClean="0"/>
+              <a:t>Git</a:t>
+            </a:r>
+            <a:r>
+              <a:rPr lang="en-US" dirty="0"/>
+              <a:t>:</a:t>
+            </a:r>
+            <a:r>
+              <a:rPr lang="en-US" dirty="0" smtClean="0"/>
+              <a:t> a Distributed VCS</a:t>
+            </a:r>
+            <a:endParaRPr lang="en-US" dirty="0"/>
+          </a:p>
+        </p:txBody>
+      </p:sp>
+      <p:sp>
+        <p:nvSpPr>
+          <p:cNvPr id="3" name="Content Placeholder 2"/>
+          <p:cNvSpPr>
+            <a:spLocks noGrp="1"/>
+          </p:cNvSpPr>
+          <p:nvPr>
+            <p:ph idx="1"/>
+          </p:nvPr>
+        </p:nvSpPr>
+        <p:spPr/>
+        <p:txBody>
+          <a:bodyPr/>
+          <a:lstStyle/>
+          <a:p>
+            <a:r>
+              <a:rPr lang="en-US" dirty="0" smtClean="0"/>
+              <a:t>Each workspace maintains it own history</a:t>
+            </a:r>
+          </a:p>
+          <a:p>
+            <a:r>
+              <a:rPr lang="en-US" dirty="0" smtClean="0"/>
+              <a:t>Commits are made to the local workspace’s history</a:t>
+            </a:r>
+          </a:p>
+          <a:p>
+            <a:r>
+              <a:rPr lang="en-US" dirty="0" smtClean="0"/>
+              <a:t>Commits are then “pushed” and “pulled” between workspaces</a:t>
+            </a:r>
+          </a:p>
+        </p:txBody>
+      </p:sp>
+    </p:spTree>
+    <p:extLst>
+      <p:ext uri="{BB962C8B-B14F-4D97-AF65-F5344CB8AC3E}">
+        <p14:creationId xmlns:p14="http://schemas.microsoft.com/office/powerpoint/2010/main" val="3746893934"/>
+      </p:ext>
+    </p:extLst>
+  </p:cSld>
+  <p:clrMapOvr>
+    <a:masterClrMapping/>
+  </p:clrMapOvr>
+</p:sld>
+</file>
+
+<file path=ppt/slides/slide9.xml><?xml version="1.0" encoding="utf-8"?>
+<p:sld xmlns:a="http://schemas.openxmlformats.org/drawingml/2006/main" xmlns:r="http://schemas.openxmlformats.org/officeDocument/2006/relationships" xmlns:p="http://schemas.openxmlformats.org/presentationml/2006/main">
+  <p:cSld>
+    <p:spTree>
+      <p:nvGrpSpPr>
+        <p:cNvPr id="1" name=""/>
+        <p:cNvGrpSpPr/>
+        <p:nvPr/>
+      </p:nvGrpSpPr>
+      <p:grpSpPr>
+        <a:xfrm>
+          <a:off x="0" y="0"/>
+          <a:ext cx="0" cy="0"/>
+          <a:chOff x="0" y="0"/>
+          <a:chExt cx="0" cy="0"/>
+        </a:xfrm>
+      </p:grpSpPr>
+      <p:sp>
+        <p:nvSpPr>
+          <p:cNvPr id="2" name="Title 1"/>
+          <p:cNvSpPr>
+            <a:spLocks noGrp="1"/>
+          </p:cNvSpPr>
+          <p:nvPr>
+            <p:ph type="title"/>
+          </p:nvPr>
+        </p:nvSpPr>
+        <p:spPr/>
+        <p:txBody>
+          <a:bodyPr/>
+          <a:lstStyle/>
+          <a:p>
+            <a:r>
+              <a:rPr lang="en-US" dirty="0" err="1" smtClean="0"/>
+              <a:t>Github</a:t>
+            </a:r>
+            <a:endParaRPr lang="en-US" dirty="0"/>
+          </a:p>
+        </p:txBody>
+      </p:sp>
+      <p:sp>
+        <p:nvSpPr>
+          <p:cNvPr id="3" name="Content Placeholder 2"/>
+          <p:cNvSpPr>
+            <a:spLocks noGrp="1"/>
+          </p:cNvSpPr>
+          <p:nvPr>
+            <p:ph idx="1"/>
+          </p:nvPr>
+        </p:nvSpPr>
+        <p:spPr/>
+        <p:txBody>
+          <a:bodyPr/>
+          <a:lstStyle/>
+          <a:p>
+            <a:r>
+              <a:rPr lang="en-US" dirty="0" smtClean="0"/>
+              <a:t>“Central” repository where </a:t>
+            </a:r>
+            <a:r>
+              <a:rPr lang="en-US" dirty="0" err="1" smtClean="0"/>
+              <a:t>git</a:t>
+            </a:r>
+            <a:r>
+              <a:rPr lang="en-US" dirty="0" smtClean="0"/>
+              <a:t> repositories are hosted</a:t>
+            </a:r>
+          </a:p>
+          <a:p>
+            <a:pPr lvl="1"/>
+            <a:r>
+              <a:rPr lang="en-US" dirty="0" smtClean="0"/>
+              <a:t>Not the only </a:t>
+            </a:r>
+            <a:r>
+              <a:rPr lang="en-US" dirty="0" err="1" smtClean="0"/>
+              <a:t>git</a:t>
+            </a:r>
+            <a:r>
+              <a:rPr lang="en-US" dirty="0" smtClean="0"/>
+              <a:t> hosting platform, just a very popular one</a:t>
+            </a:r>
+            <a:endParaRPr lang="en-US" dirty="0"/>
+          </a:p>
+        </p:txBody>
+      </p:sp>
+    </p:spTree>
+    <p:extLst>
+      <p:ext uri="{BB962C8B-B14F-4D97-AF65-F5344CB8AC3E}">
+        <p14:creationId xmlns:p14="http://schemas.microsoft.com/office/powerpoint/2010/main" val="505577709"/>
       </p:ext>
     </p:extLst>
   </p:cSld>

</xml_diff>